<commit_message>
Course delivered. Everything needs tidying up but everything presented is here.
</commit_message>
<xml_diff>
--- a/w9_data_visualisation/w9 - Data Visualization.pptx
+++ b/w9_data_visualisation/w9 - Data Visualization.pptx
@@ -37,9 +37,10 @@
     <p:sldId id="272" r:id="rId31"/>
     <p:sldId id="273" r:id="rId32"/>
     <p:sldId id="289" r:id="rId33"/>
-    <p:sldId id="290" r:id="rId34"/>
-    <p:sldId id="291" r:id="rId35"/>
-    <p:sldId id="292" r:id="rId36"/>
+    <p:sldId id="294" r:id="rId34"/>
+    <p:sldId id="290" r:id="rId35"/>
+    <p:sldId id="291" r:id="rId36"/>
+    <p:sldId id="292" r:id="rId37"/>
   </p:sldIdLst>
   <p:sldSz cx="12192000" cy="6858000"/>
   <p:notesSz cx="6888163" cy="10018713"/>
@@ -199,6 +200,7 @@
         <p14:section name="Example applications" id="{24DB809B-7C74-40CF-A685-2C68F3DFC8E3}">
           <p14:sldIdLst>
             <p14:sldId id="289"/>
+            <p14:sldId id="294"/>
             <p14:sldId id="290"/>
             <p14:sldId id="291"/>
             <p14:sldId id="292"/>
@@ -227,7 +229,7 @@
 <file path=ppt/revisionInfo.xml><?xml version="1.0" encoding="utf-8"?>
 <p1510:revInfo xmlns:a="http://schemas.openxmlformats.org/drawingml/2006/main" xmlns:r="http://schemas.openxmlformats.org/officeDocument/2006/relationships" xmlns:p1510="http://schemas.microsoft.com/office/powerpoint/2015/10/main">
   <p1510:revLst>
-    <p1510:client id="{FDB10139-A631-45C9-8CCD-E52E89C356A1}" v="44" dt="2021-11-21T13:36:10.557"/>
+    <p1510:client id="{FDB10139-A631-45C9-8CCD-E52E89C356A1}" v="45" dt="2021-11-22T07:07:22.590"/>
   </p1510:revLst>
 </p1510:revInfo>
 </file>
@@ -237,7 +239,7 @@
   <pc:docChgLst>
     <pc:chgData name="Peter McGinty" userId="138e04b35f3df159" providerId="LiveId" clId="{FDB10139-A631-45C9-8CCD-E52E89C356A1}"/>
     <pc:docChg chg="undo redo custSel addSld delSld modSld sldOrd addSection modSection">
-      <pc:chgData name="Peter McGinty" userId="138e04b35f3df159" providerId="LiveId" clId="{FDB10139-A631-45C9-8CCD-E52E89C356A1}" dt="2021-11-21T17:51:40.248" v="5396" actId="20577"/>
+      <pc:chgData name="Peter McGinty" userId="138e04b35f3df159" providerId="LiveId" clId="{FDB10139-A631-45C9-8CCD-E52E89C356A1}" dt="2021-11-22T07:12:32.720" v="5495"/>
       <pc:docMkLst>
         <pc:docMk/>
       </pc:docMkLst>
@@ -1467,6 +1469,45 @@
             <ac:picMk id="1026" creationId="{0F80F129-3114-43E6-84D0-0EFF09CA60EE}"/>
           </ac:picMkLst>
         </pc:picChg>
+      </pc:sldChg>
+      <pc:sldChg chg="addSp delSp modSp new mod ord modClrScheme chgLayout">
+        <pc:chgData name="Peter McGinty" userId="138e04b35f3df159" providerId="LiveId" clId="{FDB10139-A631-45C9-8CCD-E52E89C356A1}" dt="2021-11-22T07:12:32.720" v="5495"/>
+        <pc:sldMkLst>
+          <pc:docMk/>
+          <pc:sldMk cId="1007822625" sldId="294"/>
+        </pc:sldMkLst>
+        <pc:spChg chg="mod ord">
+          <ac:chgData name="Peter McGinty" userId="138e04b35f3df159" providerId="LiveId" clId="{FDB10139-A631-45C9-8CCD-E52E89C356A1}" dt="2021-11-22T07:12:07.884" v="5493" actId="2711"/>
+          <ac:spMkLst>
+            <pc:docMk/>
+            <pc:sldMk cId="1007822625" sldId="294"/>
+            <ac:spMk id="2" creationId="{9AE9E76B-46F9-4F34-A825-EC733570D530}"/>
+          </ac:spMkLst>
+        </pc:spChg>
+        <pc:spChg chg="del mod ord">
+          <ac:chgData name="Peter McGinty" userId="138e04b35f3df159" providerId="LiveId" clId="{FDB10139-A631-45C9-8CCD-E52E89C356A1}" dt="2021-11-22T07:05:12.788" v="5427" actId="700"/>
+          <ac:spMkLst>
+            <pc:docMk/>
+            <pc:sldMk cId="1007822625" sldId="294"/>
+            <ac:spMk id="3" creationId="{A3EF4706-CB92-47F4-AB22-FA8877ABAFB2}"/>
+          </ac:spMkLst>
+        </pc:spChg>
+        <pc:spChg chg="add mod ord">
+          <ac:chgData name="Peter McGinty" userId="138e04b35f3df159" providerId="LiveId" clId="{FDB10139-A631-45C9-8CCD-E52E89C356A1}" dt="2021-11-22T07:11:25.202" v="5489" actId="12"/>
+          <ac:spMkLst>
+            <pc:docMk/>
+            <pc:sldMk cId="1007822625" sldId="294"/>
+            <ac:spMk id="4" creationId="{5735E9C4-1142-4DFF-99D0-194C83B67416}"/>
+          </ac:spMkLst>
+        </pc:spChg>
+        <pc:spChg chg="add mod ord">
+          <ac:chgData name="Peter McGinty" userId="138e04b35f3df159" providerId="LiveId" clId="{FDB10139-A631-45C9-8CCD-E52E89C356A1}" dt="2021-11-22T07:11:34.115" v="5492" actId="12"/>
+          <ac:spMkLst>
+            <pc:docMk/>
+            <pc:sldMk cId="1007822625" sldId="294"/>
+            <ac:spMk id="5" creationId="{6D546DC8-345F-46C5-A0E2-02A11598A48D}"/>
+          </ac:spMkLst>
+        </pc:spChg>
       </pc:sldChg>
     </pc:docChg>
   </pc:docChgLst>
@@ -4533,7 +4574,7 @@
           <a:p>
             <a:fld id="{B2E23727-EE83-43E3-BAF2-05DF0E94BB9D}" type="datetimeFigureOut">
               <a:rPr lang="en-GB" smtClean="0"/>
-              <a:t>21/11/2021</a:t>
+              <a:t>22/11/2021</a:t>
             </a:fld>
             <a:endParaRPr lang="en-GB"/>
           </a:p>
@@ -4733,7 +4774,7 @@
           <a:p>
             <a:fld id="{B2E23727-EE83-43E3-BAF2-05DF0E94BB9D}" type="datetimeFigureOut">
               <a:rPr lang="en-GB" smtClean="0"/>
-              <a:t>21/11/2021</a:t>
+              <a:t>22/11/2021</a:t>
             </a:fld>
             <a:endParaRPr lang="en-GB"/>
           </a:p>
@@ -4943,7 +4984,7 @@
           <a:p>
             <a:fld id="{B2E23727-EE83-43E3-BAF2-05DF0E94BB9D}" type="datetimeFigureOut">
               <a:rPr lang="en-GB" smtClean="0"/>
-              <a:t>21/11/2021</a:t>
+              <a:t>22/11/2021</a:t>
             </a:fld>
             <a:endParaRPr lang="en-GB"/>
           </a:p>
@@ -5143,7 +5184,7 @@
           <a:p>
             <a:fld id="{B2E23727-EE83-43E3-BAF2-05DF0E94BB9D}" type="datetimeFigureOut">
               <a:rPr lang="en-GB" smtClean="0"/>
-              <a:t>21/11/2021</a:t>
+              <a:t>22/11/2021</a:t>
             </a:fld>
             <a:endParaRPr lang="en-GB"/>
           </a:p>
@@ -5419,7 +5460,7 @@
           <a:p>
             <a:fld id="{B2E23727-EE83-43E3-BAF2-05DF0E94BB9D}" type="datetimeFigureOut">
               <a:rPr lang="en-GB" smtClean="0"/>
-              <a:t>21/11/2021</a:t>
+              <a:t>22/11/2021</a:t>
             </a:fld>
             <a:endParaRPr lang="en-GB"/>
           </a:p>
@@ -5687,7 +5728,7 @@
           <a:p>
             <a:fld id="{B2E23727-EE83-43E3-BAF2-05DF0E94BB9D}" type="datetimeFigureOut">
               <a:rPr lang="en-GB" smtClean="0"/>
-              <a:t>21/11/2021</a:t>
+              <a:t>22/11/2021</a:t>
             </a:fld>
             <a:endParaRPr lang="en-GB"/>
           </a:p>
@@ -6102,7 +6143,7 @@
           <a:p>
             <a:fld id="{B2E23727-EE83-43E3-BAF2-05DF0E94BB9D}" type="datetimeFigureOut">
               <a:rPr lang="en-GB" smtClean="0"/>
-              <a:t>21/11/2021</a:t>
+              <a:t>22/11/2021</a:t>
             </a:fld>
             <a:endParaRPr lang="en-GB"/>
           </a:p>
@@ -6244,7 +6285,7 @@
           <a:p>
             <a:fld id="{B2E23727-EE83-43E3-BAF2-05DF0E94BB9D}" type="datetimeFigureOut">
               <a:rPr lang="en-GB" smtClean="0"/>
-              <a:t>21/11/2021</a:t>
+              <a:t>22/11/2021</a:t>
             </a:fld>
             <a:endParaRPr lang="en-GB"/>
           </a:p>
@@ -6357,7 +6398,7 @@
           <a:p>
             <a:fld id="{B2E23727-EE83-43E3-BAF2-05DF0E94BB9D}" type="datetimeFigureOut">
               <a:rPr lang="en-GB" smtClean="0"/>
-              <a:t>21/11/2021</a:t>
+              <a:t>22/11/2021</a:t>
             </a:fld>
             <a:endParaRPr lang="en-GB"/>
           </a:p>
@@ -6670,7 +6711,7 @@
           <a:p>
             <a:fld id="{B2E23727-EE83-43E3-BAF2-05DF0E94BB9D}" type="datetimeFigureOut">
               <a:rPr lang="en-GB" smtClean="0"/>
-              <a:t>21/11/2021</a:t>
+              <a:t>22/11/2021</a:t>
             </a:fld>
             <a:endParaRPr lang="en-GB"/>
           </a:p>
@@ -6959,7 +7000,7 @@
           <a:p>
             <a:fld id="{B2E23727-EE83-43E3-BAF2-05DF0E94BB9D}" type="datetimeFigureOut">
               <a:rPr lang="en-GB" smtClean="0"/>
-              <a:t>21/11/2021</a:t>
+              <a:t>22/11/2021</a:t>
             </a:fld>
             <a:endParaRPr lang="en-GB"/>
           </a:p>
@@ -7202,7 +7243,7 @@
           <a:p>
             <a:fld id="{B2E23727-EE83-43E3-BAF2-05DF0E94BB9D}" type="datetimeFigureOut">
               <a:rPr lang="en-GB" smtClean="0"/>
-              <a:t>21/11/2021</a:t>
+              <a:t>22/11/2021</a:t>
             </a:fld>
             <a:endParaRPr lang="en-GB"/>
           </a:p>
@@ -18068,7 +18109,7 @@
           <p:cNvPr id="2" name="Title 1">
             <a:extLst>
               <a:ext uri="{FF2B5EF4-FFF2-40B4-BE49-F238E27FC236}">
-                <a16:creationId xmlns:a16="http://schemas.microsoft.com/office/drawing/2014/main" id="{20591ECA-E8EB-47EF-9D7D-8CCF7B7AEE32}"/>
+                <a16:creationId xmlns:a16="http://schemas.microsoft.com/office/drawing/2014/main" id="{9AE9E76B-46F9-4F34-A825-EC733570D530}"/>
               </a:ext>
             </a:extLst>
           </p:cNvPr>
@@ -18085,18 +18126,20 @@
           <a:lstStyle/>
           <a:p>
             <a:r>
-              <a:rPr lang="en-GB" dirty="0"/>
-              <a:t>1 - Character Frequency Analysis of a text</a:t>
+              <a:rPr lang="en-GB" dirty="0">
+                <a:latin typeface="Lucida Console" panose="020B0609040504020204" pitchFamily="49" charset="0"/>
+              </a:rPr>
+              <a:t>Ten Simple Rules for charting</a:t>
             </a:r>
           </a:p>
         </p:txBody>
       </p:sp>
       <p:sp>
         <p:nvSpPr>
-          <p:cNvPr id="3" name="Content Placeholder 2">
+          <p:cNvPr id="4" name="Content Placeholder 3">
             <a:extLst>
               <a:ext uri="{FF2B5EF4-FFF2-40B4-BE49-F238E27FC236}">
-                <a16:creationId xmlns:a16="http://schemas.microsoft.com/office/drawing/2014/main" id="{D7A0787D-11EF-4040-A431-D876A3D75C56}"/>
+                <a16:creationId xmlns:a16="http://schemas.microsoft.com/office/drawing/2014/main" id="{5735E9C4-1142-4DFF-99D0-194C83B67416}"/>
               </a:ext>
             </a:extLst>
           </p:cNvPr>
@@ -18104,61 +18147,247 @@
             <a:spLocks noGrp="1"/>
           </p:cNvSpPr>
           <p:nvPr>
-            <p:ph idx="1"/>
+            <p:ph sz="half" idx="1"/>
           </p:nvPr>
         </p:nvSpPr>
         <p:spPr/>
         <p:txBody>
-          <a:bodyPr/>
+          <a:bodyPr>
+            <a:normAutofit lnSpcReduction="10000"/>
+          </a:bodyPr>
           <a:lstStyle/>
           <a:p>
-            <a:r>
-              <a:rPr lang="en-GB" dirty="0"/>
-              <a:t>Find a suitable source of text</a:t>
-            </a:r>
-          </a:p>
-          <a:p>
-            <a:r>
-              <a:rPr lang="en-GB" dirty="0"/>
-              <a:t>Read the text into Python</a:t>
-            </a:r>
-          </a:p>
-          <a:p>
-            <a:r>
-              <a:rPr lang="en-GB" dirty="0"/>
-              <a:t>Clean the data. Maybe it has headers, footers, page numbers, ISBN information, publication dates, etc,. Remove them.</a:t>
-            </a:r>
-          </a:p>
-          <a:p>
-            <a:r>
-              <a:rPr lang="en-GB" dirty="0"/>
-              <a:t>Decide what counts as a character. </a:t>
-            </a:r>
-          </a:p>
-          <a:p>
-            <a:r>
-              <a:rPr lang="en-GB" dirty="0"/>
-              <a:t>Count the number of occurrences of every character</a:t>
-            </a:r>
-          </a:p>
-          <a:p>
-            <a:r>
-              <a:rPr lang="en-GB" dirty="0"/>
-              <a:t>Transform that information into a </a:t>
-            </a:r>
-            <a:r>
-              <a:rPr lang="en-GB" dirty="0" err="1"/>
-              <a:t>numpy</a:t>
-            </a:r>
-            <a:r>
-              <a:rPr lang="en-GB" dirty="0"/>
-              <a:t> array</a:t>
-            </a:r>
-          </a:p>
-          <a:p>
-            <a:r>
-              <a:rPr lang="en-GB" dirty="0"/>
-              <a:t>Display using Matplotlib</a:t>
+            <a:pPr>
+              <a:buFont typeface="Wingdings" panose="05000000000000000000" pitchFamily="2" charset="2"/>
+              <a:buChar char="q"/>
+            </a:pPr>
+            <a:r>
+              <a:rPr lang="en-GB" dirty="0">
+                <a:latin typeface="Lucida Sans Unicode" panose="020B0602030504020204" pitchFamily="34" charset="0"/>
+                <a:cs typeface="Lucida Sans Unicode" panose="020B0602030504020204" pitchFamily="34" charset="0"/>
+              </a:rPr>
+              <a:t>Know Your Audience</a:t>
+            </a:r>
+          </a:p>
+          <a:p>
+            <a:pPr>
+              <a:buFont typeface="Wingdings" panose="05000000000000000000" pitchFamily="2" charset="2"/>
+              <a:buChar char="q"/>
+            </a:pPr>
+            <a:endParaRPr lang="en-GB" dirty="0">
+              <a:latin typeface="Lucida Sans Unicode" panose="020B0602030504020204" pitchFamily="34" charset="0"/>
+              <a:cs typeface="Lucida Sans Unicode" panose="020B0602030504020204" pitchFamily="34" charset="0"/>
+            </a:endParaRPr>
+          </a:p>
+          <a:p>
+            <a:pPr>
+              <a:buFont typeface="Wingdings" panose="05000000000000000000" pitchFamily="2" charset="2"/>
+              <a:buChar char="q"/>
+            </a:pPr>
+            <a:r>
+              <a:rPr lang="en-GB" dirty="0">
+                <a:latin typeface="Lucida Sans Unicode" panose="020B0602030504020204" pitchFamily="34" charset="0"/>
+                <a:cs typeface="Lucida Sans Unicode" panose="020B0602030504020204" pitchFamily="34" charset="0"/>
+              </a:rPr>
+              <a:t>Identify Your Message</a:t>
+            </a:r>
+          </a:p>
+          <a:p>
+            <a:pPr>
+              <a:buFont typeface="Wingdings" panose="05000000000000000000" pitchFamily="2" charset="2"/>
+              <a:buChar char="q"/>
+            </a:pPr>
+            <a:endParaRPr lang="en-GB" dirty="0">
+              <a:latin typeface="Lucida Sans Unicode" panose="020B0602030504020204" pitchFamily="34" charset="0"/>
+              <a:cs typeface="Lucida Sans Unicode" panose="020B0602030504020204" pitchFamily="34" charset="0"/>
+            </a:endParaRPr>
+          </a:p>
+          <a:p>
+            <a:pPr>
+              <a:buFont typeface="Wingdings" panose="05000000000000000000" pitchFamily="2" charset="2"/>
+              <a:buChar char="q"/>
+            </a:pPr>
+            <a:r>
+              <a:rPr lang="en-GB" dirty="0">
+                <a:latin typeface="Lucida Sans Unicode" panose="020B0602030504020204" pitchFamily="34" charset="0"/>
+                <a:cs typeface="Lucida Sans Unicode" panose="020B0602030504020204" pitchFamily="34" charset="0"/>
+              </a:rPr>
+              <a:t>Adapt the Figure</a:t>
+            </a:r>
+          </a:p>
+          <a:p>
+            <a:pPr>
+              <a:buFont typeface="Wingdings" panose="05000000000000000000" pitchFamily="2" charset="2"/>
+              <a:buChar char="q"/>
+            </a:pPr>
+            <a:endParaRPr lang="en-GB" dirty="0">
+              <a:latin typeface="Lucida Sans Unicode" panose="020B0602030504020204" pitchFamily="34" charset="0"/>
+              <a:cs typeface="Lucida Sans Unicode" panose="020B0602030504020204" pitchFamily="34" charset="0"/>
+            </a:endParaRPr>
+          </a:p>
+          <a:p>
+            <a:pPr>
+              <a:buFont typeface="Wingdings" panose="05000000000000000000" pitchFamily="2" charset="2"/>
+              <a:buChar char="q"/>
+            </a:pPr>
+            <a:r>
+              <a:rPr lang="en-GB" dirty="0">
+                <a:latin typeface="Lucida Sans Unicode" panose="020B0602030504020204" pitchFamily="34" charset="0"/>
+                <a:cs typeface="Lucida Sans Unicode" panose="020B0602030504020204" pitchFamily="34" charset="0"/>
+              </a:rPr>
+              <a:t>Captions Are Not Optional</a:t>
+            </a:r>
+          </a:p>
+          <a:p>
+            <a:pPr>
+              <a:buFont typeface="Wingdings" panose="05000000000000000000" pitchFamily="2" charset="2"/>
+              <a:buChar char="q"/>
+            </a:pPr>
+            <a:endParaRPr lang="en-GB" dirty="0">
+              <a:latin typeface="Lucida Sans Unicode" panose="020B0602030504020204" pitchFamily="34" charset="0"/>
+              <a:cs typeface="Lucida Sans Unicode" panose="020B0602030504020204" pitchFamily="34" charset="0"/>
+            </a:endParaRPr>
+          </a:p>
+          <a:p>
+            <a:pPr>
+              <a:buFont typeface="Wingdings" panose="05000000000000000000" pitchFamily="2" charset="2"/>
+              <a:buChar char="q"/>
+            </a:pPr>
+            <a:r>
+              <a:rPr lang="en-GB" dirty="0">
+                <a:latin typeface="Lucida Sans Unicode" panose="020B0602030504020204" pitchFamily="34" charset="0"/>
+                <a:cs typeface="Lucida Sans Unicode" panose="020B0602030504020204" pitchFamily="34" charset="0"/>
+              </a:rPr>
+              <a:t>Do Not Trust the Defaults</a:t>
+            </a:r>
+          </a:p>
+        </p:txBody>
+      </p:sp>
+      <p:sp>
+        <p:nvSpPr>
+          <p:cNvPr id="5" name="Content Placeholder 4">
+            <a:extLst>
+              <a:ext uri="{FF2B5EF4-FFF2-40B4-BE49-F238E27FC236}">
+                <a16:creationId xmlns:a16="http://schemas.microsoft.com/office/drawing/2014/main" id="{6D546DC8-345F-46C5-A0E2-02A11598A48D}"/>
+              </a:ext>
+            </a:extLst>
+          </p:cNvPr>
+          <p:cNvSpPr>
+            <a:spLocks noGrp="1"/>
+          </p:cNvSpPr>
+          <p:nvPr>
+            <p:ph sz="half" idx="2"/>
+          </p:nvPr>
+        </p:nvSpPr>
+        <p:spPr/>
+        <p:txBody>
+          <a:bodyPr>
+            <a:normAutofit lnSpcReduction="10000"/>
+          </a:bodyPr>
+          <a:lstStyle/>
+          <a:p>
+            <a:pPr>
+              <a:buFont typeface="Wingdings" panose="05000000000000000000" pitchFamily="2" charset="2"/>
+              <a:buChar char="q"/>
+            </a:pPr>
+            <a:r>
+              <a:rPr lang="en-GB" dirty="0">
+                <a:latin typeface="Lucida Sans Unicode" panose="020B0602030504020204" pitchFamily="34" charset="0"/>
+                <a:cs typeface="Lucida Sans Unicode" panose="020B0602030504020204" pitchFamily="34" charset="0"/>
+              </a:rPr>
+              <a:t>Use Colour Effectively</a:t>
+            </a:r>
+          </a:p>
+          <a:p>
+            <a:pPr>
+              <a:buFont typeface="Wingdings" panose="05000000000000000000" pitchFamily="2" charset="2"/>
+              <a:buChar char="q"/>
+            </a:pPr>
+            <a:endParaRPr lang="en-GB" dirty="0">
+              <a:latin typeface="Lucida Sans Unicode" panose="020B0602030504020204" pitchFamily="34" charset="0"/>
+              <a:cs typeface="Lucida Sans Unicode" panose="020B0602030504020204" pitchFamily="34" charset="0"/>
+            </a:endParaRPr>
+          </a:p>
+          <a:p>
+            <a:pPr>
+              <a:buFont typeface="Wingdings" panose="05000000000000000000" pitchFamily="2" charset="2"/>
+              <a:buChar char="q"/>
+            </a:pPr>
+            <a:r>
+              <a:rPr lang="en-GB" dirty="0">
+                <a:latin typeface="Lucida Sans Unicode" panose="020B0602030504020204" pitchFamily="34" charset="0"/>
+                <a:cs typeface="Lucida Sans Unicode" panose="020B0602030504020204" pitchFamily="34" charset="0"/>
+              </a:rPr>
+              <a:t>Do Not Mislead the Reader</a:t>
+            </a:r>
+          </a:p>
+          <a:p>
+            <a:pPr>
+              <a:buFont typeface="Wingdings" panose="05000000000000000000" pitchFamily="2" charset="2"/>
+              <a:buChar char="q"/>
+            </a:pPr>
+            <a:endParaRPr lang="en-GB" dirty="0">
+              <a:latin typeface="Lucida Sans Unicode" panose="020B0602030504020204" pitchFamily="34" charset="0"/>
+              <a:cs typeface="Lucida Sans Unicode" panose="020B0602030504020204" pitchFamily="34" charset="0"/>
+            </a:endParaRPr>
+          </a:p>
+          <a:p>
+            <a:pPr>
+              <a:buFont typeface="Wingdings" panose="05000000000000000000" pitchFamily="2" charset="2"/>
+              <a:buChar char="q"/>
+            </a:pPr>
+            <a:r>
+              <a:rPr lang="en-GB" dirty="0">
+                <a:latin typeface="Lucida Sans Unicode" panose="020B0602030504020204" pitchFamily="34" charset="0"/>
+                <a:cs typeface="Lucida Sans Unicode" panose="020B0602030504020204" pitchFamily="34" charset="0"/>
+              </a:rPr>
+              <a:t>Avoid “Chartjunk”</a:t>
+            </a:r>
+          </a:p>
+          <a:p>
+            <a:pPr>
+              <a:buFont typeface="Wingdings" panose="05000000000000000000" pitchFamily="2" charset="2"/>
+              <a:buChar char="q"/>
+            </a:pPr>
+            <a:endParaRPr lang="en-GB" dirty="0">
+              <a:latin typeface="Lucida Sans Unicode" panose="020B0602030504020204" pitchFamily="34" charset="0"/>
+              <a:cs typeface="Lucida Sans Unicode" panose="020B0602030504020204" pitchFamily="34" charset="0"/>
+            </a:endParaRPr>
+          </a:p>
+          <a:p>
+            <a:pPr>
+              <a:buFont typeface="Wingdings" panose="05000000000000000000" pitchFamily="2" charset="2"/>
+              <a:buChar char="q"/>
+            </a:pPr>
+            <a:r>
+              <a:rPr lang="en-GB" dirty="0">
+                <a:latin typeface="Lucida Sans Unicode" panose="020B0602030504020204" pitchFamily="34" charset="0"/>
+                <a:cs typeface="Lucida Sans Unicode" panose="020B0602030504020204" pitchFamily="34" charset="0"/>
+              </a:rPr>
+              <a:t>Message Trumps Beauty</a:t>
+            </a:r>
+          </a:p>
+          <a:p>
+            <a:pPr>
+              <a:buFont typeface="Wingdings" panose="05000000000000000000" pitchFamily="2" charset="2"/>
+              <a:buChar char="q"/>
+            </a:pPr>
+            <a:endParaRPr lang="en-GB" dirty="0">
+              <a:latin typeface="Lucida Sans Unicode" panose="020B0602030504020204" pitchFamily="34" charset="0"/>
+              <a:cs typeface="Lucida Sans Unicode" panose="020B0602030504020204" pitchFamily="34" charset="0"/>
+            </a:endParaRPr>
+          </a:p>
+          <a:p>
+            <a:pPr>
+              <a:buFont typeface="Wingdings" panose="05000000000000000000" pitchFamily="2" charset="2"/>
+              <a:buChar char="q"/>
+            </a:pPr>
+            <a:r>
+              <a:rPr lang="en-GB" dirty="0">
+                <a:latin typeface="Lucida Sans Unicode" panose="020B0602030504020204" pitchFamily="34" charset="0"/>
+                <a:cs typeface="Lucida Sans Unicode" panose="020B0602030504020204" pitchFamily="34" charset="0"/>
+              </a:rPr>
+              <a:t>Get the Right Tool</a:t>
             </a:r>
           </a:p>
         </p:txBody>
@@ -18166,7 +18395,7 @@
     </p:spTree>
     <p:extLst>
       <p:ext uri="{BB962C8B-B14F-4D97-AF65-F5344CB8AC3E}">
-        <p14:creationId xmlns:p14="http://schemas.microsoft.com/office/powerpoint/2010/main" val="3615599976"/>
+        <p14:creationId xmlns:p14="http://schemas.microsoft.com/office/powerpoint/2010/main" val="1007822625"/>
       </p:ext>
     </p:extLst>
   </p:cSld>
@@ -18216,7 +18445,7 @@
           <a:p>
             <a:r>
               <a:rPr lang="en-GB" dirty="0"/>
-              <a:t>2 - Word Frequency Analysis of a text</a:t>
+              <a:t>1 - Character Frequency Analysis of a text</a:t>
             </a:r>
           </a:p>
         </p:txBody>
@@ -18262,6 +18491,136 @@
           <a:p>
             <a:r>
               <a:rPr lang="en-GB" dirty="0"/>
+              <a:t>Decide what counts as a character. </a:t>
+            </a:r>
+          </a:p>
+          <a:p>
+            <a:r>
+              <a:rPr lang="en-GB" dirty="0"/>
+              <a:t>Count the number of occurrences of every character</a:t>
+            </a:r>
+          </a:p>
+          <a:p>
+            <a:r>
+              <a:rPr lang="en-GB" dirty="0"/>
+              <a:t>Transform that information into a </a:t>
+            </a:r>
+            <a:r>
+              <a:rPr lang="en-GB" dirty="0" err="1"/>
+              <a:t>numpy</a:t>
+            </a:r>
+            <a:r>
+              <a:rPr lang="en-GB" dirty="0"/>
+              <a:t> array</a:t>
+            </a:r>
+          </a:p>
+          <a:p>
+            <a:r>
+              <a:rPr lang="en-GB" dirty="0"/>
+              <a:t>Display using Matplotlib</a:t>
+            </a:r>
+          </a:p>
+        </p:txBody>
+      </p:sp>
+    </p:spTree>
+    <p:extLst>
+      <p:ext uri="{BB962C8B-B14F-4D97-AF65-F5344CB8AC3E}">
+        <p14:creationId xmlns:p14="http://schemas.microsoft.com/office/powerpoint/2010/main" val="3615599976"/>
+      </p:ext>
+    </p:extLst>
+  </p:cSld>
+  <p:clrMapOvr>
+    <a:masterClrMapping/>
+  </p:clrMapOvr>
+</p:sld>
+</file>
+
+<file path=ppt/slides/slide35.xml><?xml version="1.0" encoding="utf-8"?>
+<p:sld xmlns:a="http://schemas.openxmlformats.org/drawingml/2006/main" xmlns:r="http://schemas.openxmlformats.org/officeDocument/2006/relationships" xmlns:p="http://schemas.openxmlformats.org/presentationml/2006/main">
+  <p:cSld>
+    <p:spTree>
+      <p:nvGrpSpPr>
+        <p:cNvPr id="1" name=""/>
+        <p:cNvGrpSpPr/>
+        <p:nvPr/>
+      </p:nvGrpSpPr>
+      <p:grpSpPr>
+        <a:xfrm>
+          <a:off x="0" y="0"/>
+          <a:ext cx="0" cy="0"/>
+          <a:chOff x="0" y="0"/>
+          <a:chExt cx="0" cy="0"/>
+        </a:xfrm>
+      </p:grpSpPr>
+      <p:sp>
+        <p:nvSpPr>
+          <p:cNvPr id="2" name="Title 1">
+            <a:extLst>
+              <a:ext uri="{FF2B5EF4-FFF2-40B4-BE49-F238E27FC236}">
+                <a16:creationId xmlns:a16="http://schemas.microsoft.com/office/drawing/2014/main" id="{20591ECA-E8EB-47EF-9D7D-8CCF7B7AEE32}"/>
+              </a:ext>
+            </a:extLst>
+          </p:cNvPr>
+          <p:cNvSpPr>
+            <a:spLocks noGrp="1"/>
+          </p:cNvSpPr>
+          <p:nvPr>
+            <p:ph type="title"/>
+          </p:nvPr>
+        </p:nvSpPr>
+        <p:spPr/>
+        <p:txBody>
+          <a:bodyPr/>
+          <a:lstStyle/>
+          <a:p>
+            <a:r>
+              <a:rPr lang="en-GB" dirty="0"/>
+              <a:t>2 - Word Frequency Analysis of a text</a:t>
+            </a:r>
+          </a:p>
+        </p:txBody>
+      </p:sp>
+      <p:sp>
+        <p:nvSpPr>
+          <p:cNvPr id="3" name="Content Placeholder 2">
+            <a:extLst>
+              <a:ext uri="{FF2B5EF4-FFF2-40B4-BE49-F238E27FC236}">
+                <a16:creationId xmlns:a16="http://schemas.microsoft.com/office/drawing/2014/main" id="{D7A0787D-11EF-4040-A431-D876A3D75C56}"/>
+              </a:ext>
+            </a:extLst>
+          </p:cNvPr>
+          <p:cNvSpPr>
+            <a:spLocks noGrp="1"/>
+          </p:cNvSpPr>
+          <p:nvPr>
+            <p:ph idx="1"/>
+          </p:nvPr>
+        </p:nvSpPr>
+        <p:spPr/>
+        <p:txBody>
+          <a:bodyPr/>
+          <a:lstStyle/>
+          <a:p>
+            <a:r>
+              <a:rPr lang="en-GB" dirty="0"/>
+              <a:t>Find a suitable source of text</a:t>
+            </a:r>
+          </a:p>
+          <a:p>
+            <a:r>
+              <a:rPr lang="en-GB" dirty="0"/>
+              <a:t>Read the text into Python</a:t>
+            </a:r>
+          </a:p>
+          <a:p>
+            <a:r>
+              <a:rPr lang="en-GB" dirty="0"/>
+              <a:t>Clean the data. Maybe it has headers, footers, page numbers, ISBN information, publication dates, etc,. Remove them.</a:t>
+            </a:r>
+          </a:p>
+          <a:p>
+            <a:r>
+              <a:rPr lang="en-GB" dirty="0"/>
               <a:t>Decide what counts as a word. </a:t>
             </a:r>
           </a:p>
@@ -18306,7 +18665,7 @@
 </p:sld>
 </file>
 
-<file path=ppt/slides/slide35.xml><?xml version="1.0" encoding="utf-8"?>
+<file path=ppt/slides/slide36.xml><?xml version="1.0" encoding="utf-8"?>
 <p:sld xmlns:a="http://schemas.openxmlformats.org/drawingml/2006/main" xmlns:r="http://schemas.openxmlformats.org/officeDocument/2006/relationships" xmlns:p="http://schemas.openxmlformats.org/presentationml/2006/main">
   <p:cSld>
     <p:spTree>

</xml_diff>